<commit_message>
Slides 08 ready for Yoon
</commit_message>
<xml_diff>
--- a/2020/ECP/slides/08-summit-2.pptx
+++ b/2020/ECP/slides/08-summit-2.pptx
@@ -143,7 +143,7 @@
   </p:defaultTextStyle>
   <p:extLst>
     <p:ext uri="{EFAFB233-063F-42B5-8137-9DF3F51BA10A}">
-      <p15:sldGuideLst xmlns:p15="http://schemas.microsoft.com/office/powerpoint/2012/main" xmlns="">
+      <p15:sldGuideLst xmlns="" xmlns:p15="http://schemas.microsoft.com/office/powerpoint/2012/main">
         <p15:guide id="2" pos="282">
           <p15:clr>
             <a:srgbClr val="A4A3A4"/>
@@ -157,7 +157,7 @@
       </p15:sldGuideLst>
     </p:ext>
     <p:ext uri="{2D200454-40CA-4A62-9FC3-DE9A4176ACB9}">
-      <p15:notesGuideLst xmlns:p15="http://schemas.microsoft.com/office/powerpoint/2012/main" xmlns="">
+      <p15:notesGuideLst xmlns="" xmlns:p15="http://schemas.microsoft.com/office/powerpoint/2012/main">
         <p15:guide id="1" orient="horz" pos="2928">
           <p15:clr>
             <a:srgbClr val="A4A3A4"/>
@@ -262,7 +262,7 @@
           <a:p>
             <a:fld id="{0B842F42-2CE9-4E35-95C1-410DC08A50B1}" type="datetimeFigureOut">
               <a:rPr lang="en-US" smtClean="0"/>
-              <a:t>1/28/2020</a:t>
+              <a:t>2/3/2020</a:t>
             </a:fld>
             <a:endParaRPr lang="en-US"/>
           </a:p>
@@ -427,7 +427,7 @@
           <a:p>
             <a:fld id="{6F282904-F315-4730-8D91-37D99E141A6F}" type="datetimeFigureOut">
               <a:rPr lang="en-US" smtClean="0"/>
-              <a:t>1/28/2020</a:t>
+              <a:t>2/3/2020</a:t>
             </a:fld>
             <a:endParaRPr lang="en-US"/>
           </a:p>
@@ -3205,7 +3205,7 @@
           <p:cNvPr id="2" name="Title 1">
             <a:extLst>
               <a:ext uri="{FF2B5EF4-FFF2-40B4-BE49-F238E27FC236}">
-                <a16:creationId xmlns:a16="http://schemas.microsoft.com/office/drawing/2014/main" xmlns="" id="{B0E33EF4-7CD6-D546-972C-5F24984D6602}"/>
+                <a16:creationId xmlns="" xmlns:a16="http://schemas.microsoft.com/office/drawing/2014/main" id="{B0E33EF4-7CD6-D546-972C-5F24984D6602}"/>
               </a:ext>
             </a:extLst>
           </p:cNvPr>
@@ -3234,7 +3234,7 @@
           <p:cNvPr id="3" name="Content Placeholder 2">
             <a:extLst>
               <a:ext uri="{FF2B5EF4-FFF2-40B4-BE49-F238E27FC236}">
-                <a16:creationId xmlns:a16="http://schemas.microsoft.com/office/drawing/2014/main" xmlns="" id="{79DDA83B-D33A-1340-A2A9-75273506FE76}"/>
+                <a16:creationId xmlns="" xmlns:a16="http://schemas.microsoft.com/office/drawing/2014/main" id="{79DDA83B-D33A-1340-A2A9-75273506FE76}"/>
               </a:ext>
             </a:extLst>
           </p:cNvPr>
@@ -3253,6 +3253,78 @@
             <a:r>
               <a:rPr lang="en-US" dirty="0" smtClean="0"/>
               <a:t>Using NVM as a data preprocessing workspace</a:t>
+            </a:r>
+          </a:p>
+          <a:p>
+            <a:r>
+              <a:rPr lang="en-US" dirty="0"/>
+              <a:t>Copy data to </a:t>
+            </a:r>
+            <a:r>
+              <a:rPr lang="en-US" dirty="0">
+                <a:latin typeface="Consolas" panose="020B0609020204030204" pitchFamily="49" charset="0"/>
+                <a:cs typeface="Consolas" panose="020B0609020204030204" pitchFamily="49" charset="0"/>
+              </a:rPr>
+              <a:t>/</a:t>
+            </a:r>
+            <a:r>
+              <a:rPr lang="en-US" dirty="0" err="1" smtClean="0">
+                <a:latin typeface="Consolas" panose="020B0609020204030204" pitchFamily="49" charset="0"/>
+                <a:cs typeface="Consolas" panose="020B0609020204030204" pitchFamily="49" charset="0"/>
+              </a:rPr>
+              <a:t>mnt</a:t>
+            </a:r>
+            <a:r>
+              <a:rPr lang="en-US" dirty="0" smtClean="0">
+                <a:latin typeface="Consolas" panose="020B0609020204030204" pitchFamily="49" charset="0"/>
+                <a:cs typeface="Consolas" panose="020B0609020204030204" pitchFamily="49" charset="0"/>
+              </a:rPr>
+              <a:t>/bb</a:t>
+            </a:r>
+            <a:r>
+              <a:rPr lang="en-US" dirty="0" smtClean="0"/>
+              <a:t> once per workflow node</a:t>
+            </a:r>
+          </a:p>
+          <a:p>
+            <a:r>
+              <a:rPr lang="en-US" dirty="0" smtClean="0"/>
+              <a:t>Benefits:</a:t>
+            </a:r>
+          </a:p>
+          <a:p>
+            <a:pPr lvl="1"/>
+            <a:r>
+              <a:rPr lang="en-US" dirty="0" smtClean="0"/>
+              <a:t>Reuse local copy for subsequent training cycles with differen</a:t>
+            </a:r>
+            <a:r>
+              <a:rPr lang="en-US" dirty="0" smtClean="0"/>
+              <a:t>t data subsets</a:t>
+            </a:r>
+          </a:p>
+          <a:p>
+            <a:pPr lvl="1"/>
+            <a:r>
+              <a:rPr lang="en-US" dirty="0" smtClean="0"/>
+              <a:t>Faster random access for data </a:t>
+            </a:r>
+            <a:r>
+              <a:rPr lang="en-US" dirty="0" err="1" smtClean="0"/>
+              <a:t>subsetting</a:t>
+            </a:r>
+            <a:endParaRPr lang="en-US" dirty="0" smtClean="0"/>
+          </a:p>
+          <a:p>
+            <a:r>
+              <a:rPr lang="en-US" dirty="0" smtClean="0"/>
+              <a:t>Typical data rate ~1.3 GB/s for each of 128 nodes</a:t>
+            </a:r>
+          </a:p>
+          <a:p>
+            <a:r>
+              <a:rPr lang="en-US" dirty="0" smtClean="0"/>
+              <a:t>Turns data preprocessing from I/O problem to CPU problem</a:t>
             </a:r>
           </a:p>
           <a:p>
@@ -3343,12 +3415,85 @@
               <a:t>Support script modification via environment variables that inject macros into the </a:t>
             </a:r>
             <a:r>
-              <a:rPr lang="en-US" smtClean="0"/>
-              <a:t>scheduler script</a:t>
-            </a:r>
-          </a:p>
-          <a:p>
-            <a:endParaRPr lang="en-US" dirty="0"/>
+              <a:rPr lang="en-US" dirty="0" smtClean="0"/>
+              <a:t>generated </a:t>
+            </a:r>
+            <a:r>
+              <a:rPr lang="en-US" dirty="0" smtClean="0"/>
+              <a:t>LSF </a:t>
+            </a:r>
+            <a:r>
+              <a:rPr lang="en-US" dirty="0" smtClean="0"/>
+              <a:t>script</a:t>
+            </a:r>
+            <a:endParaRPr lang="en-US" dirty="0" smtClean="0"/>
+          </a:p>
+          <a:p>
+            <a:r>
+              <a:rPr lang="en-US" dirty="0"/>
+              <a:t>Setting </a:t>
+            </a:r>
+            <a:r>
+              <a:rPr lang="en-US" dirty="0" smtClean="0"/>
+              <a:t/>
+            </a:r>
+            <a:br>
+              <a:rPr lang="en-US" dirty="0" smtClean="0"/>
+            </a:br>
+            <a:r>
+              <a:rPr lang="en-US" dirty="0" smtClean="0">
+                <a:latin typeface="Consolas" panose="020B0609020204030204" pitchFamily="49" charset="0"/>
+                <a:cs typeface="Consolas" panose="020B0609020204030204" pitchFamily="49" charset="0"/>
+              </a:rPr>
+              <a:t>TURBINE_LAUNCH_OPTIONS</a:t>
+            </a:r>
+            <a:r>
+              <a:rPr lang="en-US" dirty="0">
+                <a:latin typeface="Consolas" panose="020B0609020204030204" pitchFamily="49" charset="0"/>
+                <a:cs typeface="Consolas" panose="020B0609020204030204" pitchFamily="49" charset="0"/>
+              </a:rPr>
+              <a:t>="-g6 -c42 -a1 -b </a:t>
+            </a:r>
+            <a:r>
+              <a:rPr lang="en-US" dirty="0" smtClean="0">
+                <a:latin typeface="Consolas" panose="020B0609020204030204" pitchFamily="49" charset="0"/>
+                <a:cs typeface="Consolas" panose="020B0609020204030204" pitchFamily="49" charset="0"/>
+              </a:rPr>
+              <a:t>packed:42</a:t>
+            </a:r>
+            <a:r>
+              <a:rPr lang="en-US" dirty="0">
+                <a:latin typeface="Consolas" panose="020B0609020204030204" pitchFamily="49" charset="0"/>
+                <a:cs typeface="Consolas" panose="020B0609020204030204" pitchFamily="49" charset="0"/>
+              </a:rPr>
+              <a:t>"</a:t>
+            </a:r>
+            <a:endParaRPr lang="en-US" dirty="0" smtClean="0">
+              <a:latin typeface="Consolas" panose="020B0609020204030204" pitchFamily="49" charset="0"/>
+              <a:cs typeface="Consolas" panose="020B0609020204030204" pitchFamily="49" charset="0"/>
+            </a:endParaRPr>
+          </a:p>
+          <a:p>
+            <a:r>
+              <a:rPr lang="en-US" dirty="0" smtClean="0">
+                <a:latin typeface="+mj-lt"/>
+                <a:cs typeface="Consolas" panose="020B0609020204030204" pitchFamily="49" charset="0"/>
+              </a:rPr>
+              <a:t>Sets JSRUN to use all 6 GPUs, 42 bound threads</a:t>
+            </a:r>
+          </a:p>
+          <a:p>
+            <a:r>
+              <a:rPr lang="en-US" dirty="0" smtClean="0">
+                <a:latin typeface="+mj-lt"/>
+                <a:cs typeface="Consolas" panose="020B0609020204030204" pitchFamily="49" charset="0"/>
+              </a:rPr>
+              <a:t>Other scheduler features are abstracted by Swift/T and thus common across Summit, Theta, Cori, and cluster systems (e.g., NIH Biowulf).</a:t>
+            </a:r>
+            <a:endParaRPr lang="en-US" dirty="0">
+              <a:latin typeface="+mj-lt"/>
+              <a:cs typeface="Consolas" panose="020B0609020204030204" pitchFamily="49" charset="0"/>
+            </a:endParaRPr>
           </a:p>
         </p:txBody>
       </p:sp>
@@ -3720,7 +3865,7 @@
   <a:extraClrSchemeLst/>
   <a:extLst>
     <a:ext uri="{05A4C25C-085E-4340-85A3-A5531E510DB2}">
-      <thm15:themeFamily xmlns:thm15="http://schemas.microsoft.com/office/thememl/2012/main" xmlns="" name="CANDLELib_ECP_2019" id="{8C0C58F9-E13D-C749-9CD8-D6ACD55E54AE}" vid="{C7F1EDA4-5412-C244-BA03-3C19A48BF1ED}"/>
+      <thm15:themeFamily xmlns="" xmlns:thm15="http://schemas.microsoft.com/office/thememl/2012/main" name="CANDLELib_ECP_2019" id="{8C0C58F9-E13D-C749-9CD8-D6ACD55E54AE}" vid="{C7F1EDA4-5412-C244-BA03-3C19A48BF1ED}"/>
     </a:ext>
   </a:extLst>
 </a:theme>
@@ -4297,6 +4442,21 @@
 </file>
 
 <file path=customXml/item1.xml><?xml version="1.0" encoding="utf-8"?>
+<?mso-contentType ?>
+<FormTemplates xmlns="http://schemas.microsoft.com/sharepoint/v3/contenttype/forms">
+  <Display>DocumentLibraryForm</Display>
+  <Edit>DocumentLibraryForm</Edit>
+  <New>DocumentLibraryForm</New>
+</FormTemplates>
+</file>
+
+<file path=customXml/item2.xml><?xml version="1.0" encoding="utf-8"?>
+<p:properties xmlns:p="http://schemas.microsoft.com/office/2006/metadata/properties" xmlns:xsi="http://www.w3.org/2001/XMLSchema-instance" xmlns:pc="http://schemas.microsoft.com/office/infopath/2007/PartnerControls">
+  <documentManagement/>
+</p:properties>
+</file>
+
+<file path=customXml/item3.xml><?xml version="1.0" encoding="utf-8"?>
 <ct:contentTypeSchema xmlns:ct="http://schemas.microsoft.com/office/2006/metadata/contentType" xmlns:ma="http://schemas.microsoft.com/office/2006/metadata/properties/metaAttributes" ct:_="" ma:_="" ma:contentTypeName="Document" ma:contentTypeID="0x010100693156C96291C349BBF8B640319D465D" ma:contentTypeVersion="0" ma:contentTypeDescription="Create a new document." ma:contentTypeScope="" ma:versionID="8a71be8d30b42e8e74cf70a4a4cbda4c">
   <xsd:schema xmlns:xsd="http://www.w3.org/2001/XMLSchema" xmlns:p="http://schemas.microsoft.com/office/2006/metadata/properties" targetNamespace="http://schemas.microsoft.com/office/2006/metadata/properties" ma:root="true" ma:fieldsID="4aeb20c0e3442673af7ee10786458764">
     <xsd:element name="properties">
@@ -4345,22 +4505,29 @@
 </ct:contentTypeSchema>
 </file>
 
-<file path=customXml/item2.xml><?xml version="1.0" encoding="utf-8"?>
-<p:properties xmlns:p="http://schemas.microsoft.com/office/2006/metadata/properties" xmlns:xsi="http://www.w3.org/2001/XMLSchema-instance" xmlns:pc="http://schemas.microsoft.com/office/infopath/2007/PartnerControls">
-  <documentManagement/>
-</p:properties>
+<file path=customXml/itemProps1.xml><?xml version="1.0" encoding="utf-8"?>
+<ds:datastoreItem xmlns:ds="http://schemas.openxmlformats.org/officeDocument/2006/customXml" ds:itemID="{19E20559-B232-4371-8690-E3D8007EDB82}">
+  <ds:schemaRefs>
+    <ds:schemaRef ds:uri="http://schemas.microsoft.com/sharepoint/v3/contenttype/forms"/>
+  </ds:schemaRefs>
+</ds:datastoreItem>
 </file>
 
-<file path=customXml/item3.xml><?xml version="1.0" encoding="utf-8"?>
-<?mso-contentType ?>
-<FormTemplates xmlns="http://schemas.microsoft.com/sharepoint/v3/contenttype/forms">
-  <Display>DocumentLibraryForm</Display>
-  <Edit>DocumentLibraryForm</Edit>
-  <New>DocumentLibraryForm</New>
-</FormTemplates>
+<file path=customXml/itemProps2.xml><?xml version="1.0" encoding="utf-8"?>
+<ds:datastoreItem xmlns:ds="http://schemas.openxmlformats.org/officeDocument/2006/customXml" ds:itemID="{A50EC660-24D0-43A0-AE5E-E274115E726B}">
+  <ds:schemaRefs>
+    <ds:schemaRef ds:uri="http://schemas.openxmlformats.org/package/2006/metadata/core-properties"/>
+    <ds:schemaRef ds:uri="http://schemas.microsoft.com/office/2006/documentManagement/types"/>
+    <ds:schemaRef ds:uri="http://purl.org/dc/elements/1.1/"/>
+    <ds:schemaRef ds:uri="http://schemas.microsoft.com/office/2006/metadata/properties"/>
+    <ds:schemaRef ds:uri="http://purl.org/dc/terms/"/>
+    <ds:schemaRef ds:uri="http://www.w3.org/XML/1998/namespace"/>
+    <ds:schemaRef ds:uri="http://purl.org/dc/dcmitype/"/>
+  </ds:schemaRefs>
+</ds:datastoreItem>
 </file>
 
-<file path=customXml/itemProps1.xml><?xml version="1.0" encoding="utf-8"?>
+<file path=customXml/itemProps3.xml><?xml version="1.0" encoding="utf-8"?>
 <ds:datastoreItem xmlns:ds="http://schemas.openxmlformats.org/officeDocument/2006/customXml" ds:itemID="{D85F602D-FF92-4BDD-B4C2-093468CCF754}">
   <ds:schemaRefs>
     <ds:schemaRef ds:uri="http://schemas.microsoft.com/office/2006/metadata/contentType"/>
@@ -4373,26 +4540,4 @@
     <ds:schemaRef ds:uri="http://schemas.microsoft.com/office/internal/2005/internalDocumentation"/>
   </ds:schemaRefs>
 </ds:datastoreItem>
-</file>
-
-<file path=customXml/itemProps2.xml><?xml version="1.0" encoding="utf-8"?>
-<ds:datastoreItem xmlns:ds="http://schemas.openxmlformats.org/officeDocument/2006/customXml" ds:itemID="{A50EC660-24D0-43A0-AE5E-E274115E726B}">
-  <ds:schemaRefs>
-    <ds:schemaRef ds:uri="http://purl.org/dc/terms/"/>
-    <ds:schemaRef ds:uri="http://schemas.openxmlformats.org/package/2006/metadata/core-properties"/>
-    <ds:schemaRef ds:uri="http://schemas.microsoft.com/office/2006/documentManagement/types"/>
-    <ds:schemaRef ds:uri="http://purl.org/dc/elements/1.1/"/>
-    <ds:schemaRef ds:uri="http://schemas.microsoft.com/office/2006/metadata/properties"/>
-    <ds:schemaRef ds:uri="http://www.w3.org/XML/1998/namespace"/>
-    <ds:schemaRef ds:uri="http://purl.org/dc/dcmitype/"/>
-  </ds:schemaRefs>
-</ds:datastoreItem>
-</file>
-
-<file path=customXml/itemProps3.xml><?xml version="1.0" encoding="utf-8"?>
-<ds:datastoreItem xmlns:ds="http://schemas.openxmlformats.org/officeDocument/2006/customXml" ds:itemID="{19E20559-B232-4371-8690-E3D8007EDB82}">
-  <ds:schemaRefs>
-    <ds:schemaRef ds:uri="http://schemas.microsoft.com/sharepoint/v3/contenttype/forms"/>
-  </ds:schemaRefs>
-</ds:datastoreItem>
 </file>
</xml_diff>